<commit_message>
Login, Models TipoUsuario, Usuario
</commit_message>
<xml_diff>
--- a/UI.pptx
+++ b/UI.pptx
@@ -262,7 +262,7 @@
           <a:p>
             <a:fld id="{09850A1F-9877-4EC3-8E04-4C1F957B810E}" type="datetimeFigureOut">
               <a:rPr lang="es-MX" smtClean="0"/>
-              <a:t>19/11/2019</a:t>
+              <a:t>21/11/2019</a:t>
             </a:fld>
             <a:endParaRPr lang="es-MX"/>
           </a:p>
@@ -462,7 +462,7 @@
           <a:p>
             <a:fld id="{09850A1F-9877-4EC3-8E04-4C1F957B810E}" type="datetimeFigureOut">
               <a:rPr lang="es-MX" smtClean="0"/>
-              <a:t>19/11/2019</a:t>
+              <a:t>21/11/2019</a:t>
             </a:fld>
             <a:endParaRPr lang="es-MX"/>
           </a:p>
@@ -672,7 +672,7 @@
           <a:p>
             <a:fld id="{09850A1F-9877-4EC3-8E04-4C1F957B810E}" type="datetimeFigureOut">
               <a:rPr lang="es-MX" smtClean="0"/>
-              <a:t>19/11/2019</a:t>
+              <a:t>21/11/2019</a:t>
             </a:fld>
             <a:endParaRPr lang="es-MX"/>
           </a:p>
@@ -872,7 +872,7 @@
           <a:p>
             <a:fld id="{09850A1F-9877-4EC3-8E04-4C1F957B810E}" type="datetimeFigureOut">
               <a:rPr lang="es-MX" smtClean="0"/>
-              <a:t>19/11/2019</a:t>
+              <a:t>21/11/2019</a:t>
             </a:fld>
             <a:endParaRPr lang="es-MX"/>
           </a:p>
@@ -1148,7 +1148,7 @@
           <a:p>
             <a:fld id="{09850A1F-9877-4EC3-8E04-4C1F957B810E}" type="datetimeFigureOut">
               <a:rPr lang="es-MX" smtClean="0"/>
-              <a:t>19/11/2019</a:t>
+              <a:t>21/11/2019</a:t>
             </a:fld>
             <a:endParaRPr lang="es-MX"/>
           </a:p>
@@ -1416,7 +1416,7 @@
           <a:p>
             <a:fld id="{09850A1F-9877-4EC3-8E04-4C1F957B810E}" type="datetimeFigureOut">
               <a:rPr lang="es-MX" smtClean="0"/>
-              <a:t>19/11/2019</a:t>
+              <a:t>21/11/2019</a:t>
             </a:fld>
             <a:endParaRPr lang="es-MX"/>
           </a:p>
@@ -1831,7 +1831,7 @@
           <a:p>
             <a:fld id="{09850A1F-9877-4EC3-8E04-4C1F957B810E}" type="datetimeFigureOut">
               <a:rPr lang="es-MX" smtClean="0"/>
-              <a:t>19/11/2019</a:t>
+              <a:t>21/11/2019</a:t>
             </a:fld>
             <a:endParaRPr lang="es-MX"/>
           </a:p>
@@ -1973,7 +1973,7 @@
           <a:p>
             <a:fld id="{09850A1F-9877-4EC3-8E04-4C1F957B810E}" type="datetimeFigureOut">
               <a:rPr lang="es-MX" smtClean="0"/>
-              <a:t>19/11/2019</a:t>
+              <a:t>21/11/2019</a:t>
             </a:fld>
             <a:endParaRPr lang="es-MX"/>
           </a:p>
@@ -2086,7 +2086,7 @@
           <a:p>
             <a:fld id="{09850A1F-9877-4EC3-8E04-4C1F957B810E}" type="datetimeFigureOut">
               <a:rPr lang="es-MX" smtClean="0"/>
-              <a:t>19/11/2019</a:t>
+              <a:t>21/11/2019</a:t>
             </a:fld>
             <a:endParaRPr lang="es-MX"/>
           </a:p>
@@ -2399,7 +2399,7 @@
           <a:p>
             <a:fld id="{09850A1F-9877-4EC3-8E04-4C1F957B810E}" type="datetimeFigureOut">
               <a:rPr lang="es-MX" smtClean="0"/>
-              <a:t>19/11/2019</a:t>
+              <a:t>21/11/2019</a:t>
             </a:fld>
             <a:endParaRPr lang="es-MX"/>
           </a:p>
@@ -2688,7 +2688,7 @@
           <a:p>
             <a:fld id="{09850A1F-9877-4EC3-8E04-4C1F957B810E}" type="datetimeFigureOut">
               <a:rPr lang="es-MX" smtClean="0"/>
-              <a:t>19/11/2019</a:t>
+              <a:t>21/11/2019</a:t>
             </a:fld>
             <a:endParaRPr lang="es-MX"/>
           </a:p>
@@ -2931,7 +2931,7 @@
           <a:p>
             <a:fld id="{09850A1F-9877-4EC3-8E04-4C1F957B810E}" type="datetimeFigureOut">
               <a:rPr lang="es-MX" smtClean="0"/>
-              <a:t>19/11/2019</a:t>
+              <a:t>21/11/2019</a:t>
             </a:fld>
             <a:endParaRPr lang="es-MX"/>
           </a:p>
@@ -3363,7 +3363,7 @@
         <p:spPr>
           <a:xfrm>
             <a:off x="3333800" y="464232"/>
-            <a:ext cx="8102987" cy="4304714"/>
+            <a:ext cx="3943643" cy="4304714"/>
           </a:xfrm>
           <a:prstGeom prst="rect">
             <a:avLst/>
@@ -3713,12 +3713,331 @@
           </a:p>
         </p:txBody>
       </p:sp>
+      <p:sp>
+        <p:nvSpPr>
+          <p:cNvPr id="18" name="CuadroTexto 17">
+            <a:extLst>
+              <a:ext uri="{FF2B5EF4-FFF2-40B4-BE49-F238E27FC236}">
+                <a16:creationId xmlns:a16="http://schemas.microsoft.com/office/drawing/2014/main" id="{F663D0BE-518D-4C48-A1A9-7C8962724C13}"/>
+              </a:ext>
+            </a:extLst>
+          </p:cNvPr>
+          <p:cNvSpPr txBox="1"/>
+          <p:nvPr/>
+        </p:nvSpPr>
+        <p:spPr>
+          <a:xfrm>
+            <a:off x="4570484" y="1842945"/>
+            <a:ext cx="1470274" cy="307777"/>
+          </a:xfrm>
+          <a:prstGeom prst="rect">
+            <a:avLst/>
+          </a:prstGeom>
+          <a:noFill/>
+        </p:spPr>
+        <p:txBody>
+          <a:bodyPr wrap="none" rtlCol="0">
+            <a:spAutoFit/>
+          </a:bodyPr>
+          <a:lstStyle/>
+          <a:p>
+            <a:r>
+              <a:rPr lang="es-MX" sz="1400" dirty="0">
+                <a:solidFill>
+                  <a:srgbClr val="424242"/>
+                </a:solidFill>
+                <a:latin typeface="Roboto" pitchFamily="2" charset="0"/>
+                <a:ea typeface="Roboto" pitchFamily="2" charset="0"/>
+              </a:rPr>
+              <a:t>INICIAR SESION</a:t>
+            </a:r>
+          </a:p>
+        </p:txBody>
+      </p:sp>
+      <p:sp>
+        <p:nvSpPr>
+          <p:cNvPr id="19" name="Rectángulo 18">
+            <a:extLst>
+              <a:ext uri="{FF2B5EF4-FFF2-40B4-BE49-F238E27FC236}">
+                <a16:creationId xmlns:a16="http://schemas.microsoft.com/office/drawing/2014/main" id="{11795FA5-BEEE-458E-9C31-A5D24A1AA9FF}"/>
+              </a:ext>
+            </a:extLst>
+          </p:cNvPr>
+          <p:cNvSpPr/>
+          <p:nvPr/>
+        </p:nvSpPr>
+        <p:spPr>
+          <a:xfrm>
+            <a:off x="4462074" y="2283950"/>
+            <a:ext cx="862614" cy="238539"/>
+          </a:xfrm>
+          <a:prstGeom prst="rect">
+            <a:avLst/>
+          </a:prstGeom>
+          <a:ln>
+            <a:solidFill>
+              <a:srgbClr val="005CB9"/>
+            </a:solidFill>
+          </a:ln>
+        </p:spPr>
+        <p:style>
+          <a:lnRef idx="2">
+            <a:schemeClr val="accent6"/>
+          </a:lnRef>
+          <a:fillRef idx="1">
+            <a:schemeClr val="lt1"/>
+          </a:fillRef>
+          <a:effectRef idx="0">
+            <a:schemeClr val="accent6"/>
+          </a:effectRef>
+          <a:fontRef idx="minor">
+            <a:schemeClr val="dk1"/>
+          </a:fontRef>
+        </p:style>
+        <p:txBody>
+          <a:bodyPr rtlCol="0" anchor="ctr"/>
+          <a:lstStyle/>
+          <a:p>
+            <a:pPr algn="ctr"/>
+            <a:endParaRPr lang="es-MX"/>
+          </a:p>
+        </p:txBody>
+      </p:sp>
+      <p:sp>
+        <p:nvSpPr>
+          <p:cNvPr id="20" name="Rectángulo 19">
+            <a:extLst>
+              <a:ext uri="{FF2B5EF4-FFF2-40B4-BE49-F238E27FC236}">
+                <a16:creationId xmlns:a16="http://schemas.microsoft.com/office/drawing/2014/main" id="{DC6A62C2-F01D-4A0B-9DDF-F39341CE1C34}"/>
+              </a:ext>
+            </a:extLst>
+          </p:cNvPr>
+          <p:cNvSpPr/>
+          <p:nvPr/>
+        </p:nvSpPr>
+        <p:spPr>
+          <a:xfrm>
+            <a:off x="5321805" y="2283950"/>
+            <a:ext cx="862614" cy="238539"/>
+          </a:xfrm>
+          <a:prstGeom prst="rect">
+            <a:avLst/>
+          </a:prstGeom>
+          <a:ln>
+            <a:solidFill>
+              <a:srgbClr val="005CB9"/>
+            </a:solidFill>
+          </a:ln>
+        </p:spPr>
+        <p:style>
+          <a:lnRef idx="2">
+            <a:schemeClr val="accent6"/>
+          </a:lnRef>
+          <a:fillRef idx="1">
+            <a:schemeClr val="lt1"/>
+          </a:fillRef>
+          <a:effectRef idx="0">
+            <a:schemeClr val="accent6"/>
+          </a:effectRef>
+          <a:fontRef idx="minor">
+            <a:schemeClr val="dk1"/>
+          </a:fontRef>
+        </p:style>
+        <p:txBody>
+          <a:bodyPr rtlCol="0" anchor="ctr"/>
+          <a:lstStyle/>
+          <a:p>
+            <a:pPr algn="ctr"/>
+            <a:endParaRPr lang="es-MX"/>
+          </a:p>
+        </p:txBody>
+      </p:sp>
+      <p:sp>
+        <p:nvSpPr>
+          <p:cNvPr id="21" name="CuadroTexto 20">
+            <a:extLst>
+              <a:ext uri="{FF2B5EF4-FFF2-40B4-BE49-F238E27FC236}">
+                <a16:creationId xmlns:a16="http://schemas.microsoft.com/office/drawing/2014/main" id="{E8B97C7C-25C9-443D-8FD3-6D9450FC1A84}"/>
+              </a:ext>
+            </a:extLst>
+          </p:cNvPr>
+          <p:cNvSpPr txBox="1"/>
+          <p:nvPr/>
+        </p:nvSpPr>
+        <p:spPr>
+          <a:xfrm>
+            <a:off x="5318923" y="2287722"/>
+            <a:ext cx="862613" cy="261610"/>
+          </a:xfrm>
+          <a:prstGeom prst="rect">
+            <a:avLst/>
+          </a:prstGeom>
+          <a:noFill/>
+        </p:spPr>
+        <p:txBody>
+          <a:bodyPr wrap="square" rtlCol="0">
+            <a:spAutoFit/>
+          </a:bodyPr>
+          <a:lstStyle/>
+          <a:p>
+            <a:pPr algn="ctr"/>
+            <a:r>
+              <a:rPr lang="es-MX" sz="1100" dirty="0">
+                <a:solidFill>
+                  <a:srgbClr val="424242"/>
+                </a:solidFill>
+                <a:latin typeface="Roboto" pitchFamily="2" charset="0"/>
+                <a:ea typeface="Roboto" pitchFamily="2" charset="0"/>
+              </a:rPr>
+              <a:t>Pin</a:t>
+            </a:r>
+          </a:p>
+        </p:txBody>
+      </p:sp>
+      <p:sp>
+        <p:nvSpPr>
+          <p:cNvPr id="22" name="CuadroTexto 21">
+            <a:extLst>
+              <a:ext uri="{FF2B5EF4-FFF2-40B4-BE49-F238E27FC236}">
+                <a16:creationId xmlns:a16="http://schemas.microsoft.com/office/drawing/2014/main" id="{CF8703D8-F448-4BD3-B502-E778A6B0C1F0}"/>
+              </a:ext>
+            </a:extLst>
+          </p:cNvPr>
+          <p:cNvSpPr txBox="1"/>
+          <p:nvPr/>
+        </p:nvSpPr>
+        <p:spPr>
+          <a:xfrm>
+            <a:off x="4484214" y="2286482"/>
+            <a:ext cx="837591" cy="261610"/>
+          </a:xfrm>
+          <a:prstGeom prst="rect">
+            <a:avLst/>
+          </a:prstGeom>
+          <a:noFill/>
+        </p:spPr>
+        <p:txBody>
+          <a:bodyPr wrap="square" rtlCol="0">
+            <a:spAutoFit/>
+          </a:bodyPr>
+          <a:lstStyle/>
+          <a:p>
+            <a:pPr algn="ctr"/>
+            <a:r>
+              <a:rPr lang="es-MX" sz="1100" dirty="0">
+                <a:solidFill>
+                  <a:srgbClr val="424242"/>
+                </a:solidFill>
+                <a:latin typeface="Roboto" pitchFamily="2" charset="0"/>
+                <a:ea typeface="Roboto" pitchFamily="2" charset="0"/>
+              </a:rPr>
+              <a:t>Usuario</a:t>
+            </a:r>
+          </a:p>
+        </p:txBody>
+      </p:sp>
+      <p:sp>
+        <p:nvSpPr>
+          <p:cNvPr id="23" name="Rectángulo: esquinas redondeadas 22">
+            <a:extLst>
+              <a:ext uri="{FF2B5EF4-FFF2-40B4-BE49-F238E27FC236}">
+                <a16:creationId xmlns:a16="http://schemas.microsoft.com/office/drawing/2014/main" id="{A4513FE7-1376-4228-8625-C8E0E721604D}"/>
+              </a:ext>
+            </a:extLst>
+          </p:cNvPr>
+          <p:cNvSpPr/>
+          <p:nvPr/>
+        </p:nvSpPr>
+        <p:spPr>
+          <a:xfrm>
+            <a:off x="4447382" y="2667552"/>
+            <a:ext cx="1722345" cy="276999"/>
+          </a:xfrm>
+          <a:prstGeom prst="roundRect">
+            <a:avLst>
+              <a:gd name="adj" fmla="val 5733"/>
+            </a:avLst>
+          </a:prstGeom>
+          <a:solidFill>
+            <a:srgbClr val="24272A"/>
+          </a:solidFill>
+          <a:ln>
+            <a:noFill/>
+          </a:ln>
+        </p:spPr>
+        <p:style>
+          <a:lnRef idx="2">
+            <a:schemeClr val="accent1">
+              <a:shade val="50000"/>
+            </a:schemeClr>
+          </a:lnRef>
+          <a:fillRef idx="1">
+            <a:schemeClr val="accent1"/>
+          </a:fillRef>
+          <a:effectRef idx="0">
+            <a:schemeClr val="accent1"/>
+          </a:effectRef>
+          <a:fontRef idx="minor">
+            <a:schemeClr val="lt1"/>
+          </a:fontRef>
+        </p:style>
+        <p:txBody>
+          <a:bodyPr rtlCol="0" anchor="ctr"/>
+          <a:lstStyle/>
+          <a:p>
+            <a:pPr algn="ctr"/>
+            <a:endParaRPr lang="es-MX"/>
+          </a:p>
+        </p:txBody>
+      </p:sp>
+      <p:sp>
+        <p:nvSpPr>
+          <p:cNvPr id="24" name="CuadroTexto 23">
+            <a:extLst>
+              <a:ext uri="{FF2B5EF4-FFF2-40B4-BE49-F238E27FC236}">
+                <a16:creationId xmlns:a16="http://schemas.microsoft.com/office/drawing/2014/main" id="{ADDEE218-CC52-4421-BAEB-5AB2A228DC28}"/>
+              </a:ext>
+            </a:extLst>
+          </p:cNvPr>
+          <p:cNvSpPr txBox="1"/>
+          <p:nvPr/>
+        </p:nvSpPr>
+        <p:spPr>
+          <a:xfrm>
+            <a:off x="4787835" y="2680804"/>
+            <a:ext cx="1038553" cy="261610"/>
+          </a:xfrm>
+          <a:prstGeom prst="rect">
+            <a:avLst/>
+          </a:prstGeom>
+          <a:noFill/>
+        </p:spPr>
+        <p:txBody>
+          <a:bodyPr wrap="square" rtlCol="0">
+            <a:spAutoFit/>
+          </a:bodyPr>
+          <a:lstStyle/>
+          <a:p>
+            <a:pPr algn="ctr"/>
+            <a:r>
+              <a:rPr lang="es-MX" sz="1100" dirty="0">
+                <a:solidFill>
+                  <a:schemeClr val="bg1"/>
+                </a:solidFill>
+                <a:latin typeface="Roboto" pitchFamily="2" charset="0"/>
+                <a:ea typeface="Roboto" pitchFamily="2" charset="0"/>
+              </a:rPr>
+              <a:t>ENTRAR</a:t>
+            </a:r>
+          </a:p>
+        </p:txBody>
+      </p:sp>
       <p:pic>
         <p:nvPicPr>
-          <p:cNvPr id="4" name="Imagen 3">
-            <a:extLst>
-              <a:ext uri="{FF2B5EF4-FFF2-40B4-BE49-F238E27FC236}">
-                <a16:creationId xmlns:a16="http://schemas.microsoft.com/office/drawing/2014/main" id="{E2EAEA55-7C52-469D-934D-41F836D00F37}"/>
+          <p:cNvPr id="6" name="Imagen 5">
+            <a:extLst>
+              <a:ext uri="{FF2B5EF4-FFF2-40B4-BE49-F238E27FC236}">
+                <a16:creationId xmlns:a16="http://schemas.microsoft.com/office/drawing/2014/main" id="{7C84C667-2AEB-4401-9354-07D43E411006}"/>
               </a:ext>
             </a:extLst>
           </p:cNvPr>
@@ -3741,8 +4060,8 @@
         </p:blipFill>
         <p:spPr>
           <a:xfrm>
-            <a:off x="8389727" y="1325959"/>
-            <a:ext cx="2464612" cy="2053843"/>
+            <a:off x="4693764" y="604622"/>
+            <a:ext cx="1223715" cy="1019762"/>
           </a:xfrm>
           <a:prstGeom prst="rect">
             <a:avLst/>

</xml_diff>